<commit_message>
[no-task]: more thesis changes
</commit_message>
<xml_diff>
--- a/3_Thesis/gfx/architecture.pptx
+++ b/3_Thesis/gfx/architecture.pptx
@@ -3132,8 +3132,13 @@
             <a:pPr algn="ctr"/>
             <a:r>
               <a:rPr lang="de-DE" sz="2400" dirty="0" smtClean="0"/>
-              <a:t>Storage-Layer: </a:t>
-            </a:r>
+              <a:t>Storage</a:t>
+            </a:r>
+            <a:r>
+              <a:rPr lang="de-DE" sz="2400" dirty="0"/>
+              <a:t>-Tier: </a:t>
+            </a:r>
+            <a:endParaRPr lang="de-DE" sz="2400" dirty="0" smtClean="0"/>
           </a:p>
           <a:p>
             <a:pPr algn="ctr"/>
@@ -3185,9 +3190,10 @@
               <a:t>Application</a:t>
             </a:r>
             <a:r>
-              <a:rPr lang="de-DE" sz="2400" dirty="0" smtClean="0"/>
-              <a:t>-Layer:</a:t>
-            </a:r>
+              <a:rPr lang="de-DE" sz="2400" dirty="0"/>
+              <a:t>-Tier:</a:t>
+            </a:r>
+            <a:endParaRPr lang="de-DE" sz="2400" dirty="0" smtClean="0"/>
           </a:p>
           <a:p>
             <a:pPr algn="ctr"/>
@@ -3248,8 +3254,9 @@
             </a:r>
             <a:r>
               <a:rPr lang="de-DE" sz="2400" dirty="0" smtClean="0"/>
-              <a:t>-Layer:</a:t>
-            </a:r>
+              <a:t>-Tier:</a:t>
+            </a:r>
+            <a:endParaRPr lang="de-DE" sz="2400" dirty="0" smtClean="0"/>
           </a:p>
           <a:p>
             <a:pPr algn="ctr"/>
@@ -3434,9 +3441,10 @@
               <a:t>Application</a:t>
             </a:r>
             <a:r>
-              <a:rPr lang="de-DE" sz="2400" dirty="0" smtClean="0"/>
-              <a:t>-Layer:</a:t>
-            </a:r>
+              <a:rPr lang="de-DE" sz="2400" dirty="0"/>
+              <a:t>-Tier:</a:t>
+            </a:r>
+            <a:endParaRPr lang="de-DE" sz="2400" dirty="0" smtClean="0"/>
           </a:p>
           <a:p>
             <a:pPr algn="ctr"/>
@@ -3444,7 +3452,6 @@
               <a:rPr lang="de-DE" sz="2400" dirty="0" smtClean="0"/>
               <a:t>Smartphone-App</a:t>
             </a:r>
-            <a:endParaRPr lang="de-DE" sz="2400" dirty="0" smtClean="0"/>
           </a:p>
         </p:txBody>
       </p:sp>

</xml_diff>